<commit_message>
before converting unit by scaling w flash length
</commit_message>
<xml_diff>
--- a/code/ds_ventral/20200416.pptx
+++ b/code/ds_ventral/20200416.pptx
@@ -113,6 +113,11 @@
       </a:defRPr>
     </a:lvl9pPr>
   </p:defaultTextStyle>
+  <p:extLst>
+    <p:ext uri="{EFAFB233-063F-42B5-8137-9DF3F51BA10A}">
+      <p15:sldGuideLst xmlns:p15="http://schemas.microsoft.com/office/powerpoint/2012/main"/>
+    </p:ext>
+  </p:extLst>
 </p:presentation>
 </file>
 
@@ -3490,6 +3495,149 @@
           </p:spPr>
         </p:pic>
       </p:grpSp>
+      <p:cxnSp>
+        <p:nvCxnSpPr>
+          <p:cNvPr id="6" name="直接连接符 5"/>
+          <p:cNvCxnSpPr/>
+          <p:nvPr/>
+        </p:nvCxnSpPr>
+        <p:spPr>
+          <a:xfrm flipV="1">
+            <a:off x="1317072" y="234892"/>
+            <a:ext cx="0" cy="6258187"/>
+          </a:xfrm>
+          <a:prstGeom prst="line">
+            <a:avLst/>
+          </a:prstGeom>
+          <a:solidFill>
+            <a:srgbClr val="FFFF99">
+              <a:alpha val="23922"/>
+            </a:srgbClr>
+          </a:solidFill>
+          <a:ln w="57150">
+            <a:solidFill>
+              <a:srgbClr val="FFFF00">
+                <a:alpha val="30196"/>
+              </a:srgbClr>
+            </a:solidFill>
+          </a:ln>
+        </p:spPr>
+        <p:style>
+          <a:lnRef idx="2">
+            <a:schemeClr val="accent1">
+              <a:shade val="50000"/>
+            </a:schemeClr>
+          </a:lnRef>
+          <a:fillRef idx="1">
+            <a:schemeClr val="accent1"/>
+          </a:fillRef>
+          <a:effectRef idx="0">
+            <a:schemeClr val="accent1"/>
+          </a:effectRef>
+          <a:fontRef idx="minor">
+            <a:schemeClr val="lt1"/>
+          </a:fontRef>
+        </p:style>
+      </p:cxnSp>
+      <p:cxnSp>
+        <p:nvCxnSpPr>
+          <p:cNvPr id="7" name="直接连接符 6"/>
+          <p:cNvCxnSpPr/>
+          <p:nvPr/>
+        </p:nvCxnSpPr>
+        <p:spPr>
+          <a:xfrm flipV="1">
+            <a:off x="6753138" y="243281"/>
+            <a:ext cx="0" cy="6258187"/>
+          </a:xfrm>
+          <a:prstGeom prst="line">
+            <a:avLst/>
+          </a:prstGeom>
+          <a:solidFill>
+            <a:srgbClr val="FFFF99">
+              <a:alpha val="23922"/>
+            </a:srgbClr>
+          </a:solidFill>
+          <a:ln w="57150">
+            <a:solidFill>
+              <a:srgbClr val="FFFF00">
+                <a:alpha val="30196"/>
+              </a:srgbClr>
+            </a:solidFill>
+          </a:ln>
+        </p:spPr>
+        <p:style>
+          <a:lnRef idx="2">
+            <a:schemeClr val="accent1">
+              <a:shade val="50000"/>
+            </a:schemeClr>
+          </a:lnRef>
+          <a:fillRef idx="1">
+            <a:schemeClr val="accent1"/>
+          </a:fillRef>
+          <a:effectRef idx="0">
+            <a:schemeClr val="accent1"/>
+          </a:effectRef>
+          <a:fontRef idx="minor">
+            <a:schemeClr val="lt1"/>
+          </a:fontRef>
+        </p:style>
+      </p:cxnSp>
+      <p:sp>
+        <p:nvSpPr>
+          <p:cNvPr id="8" name="文本框 7"/>
+          <p:cNvSpPr txBox="1"/>
+          <p:nvPr/>
+        </p:nvSpPr>
+        <p:spPr>
+          <a:xfrm>
+            <a:off x="8831447" y="6090302"/>
+            <a:ext cx="2342501" cy="369332"/>
+          </a:xfrm>
+          <a:prstGeom prst="rect">
+            <a:avLst/>
+          </a:prstGeom>
+          <a:noFill/>
+        </p:spPr>
+        <p:txBody>
+          <a:bodyPr wrap="none" rtlCol="0">
+            <a:spAutoFit/>
+          </a:bodyPr>
+          <a:lstStyle/>
+          <a:p>
+            <a:r>
+              <a:rPr lang="en-US" smtClean="0">
+                <a:solidFill>
+                  <a:srgbClr val="C00000"/>
+                </a:solidFill>
+              </a:rPr>
+              <a:t>long </a:t>
+            </a:r>
+            <a:r>
+              <a:rPr lang="en-US" smtClean="0">
+                <a:solidFill>
+                  <a:srgbClr val="C00000"/>
+                </a:solidFill>
+              </a:rPr>
+              <a:t>latency </a:t>
+            </a:r>
+            <a:r>
+              <a:rPr lang="en-US" smtClean="0">
+                <a:solidFill>
+                  <a:srgbClr val="C00000"/>
+                </a:solidFill>
+                <a:sym typeface="Wingdings" panose="05000000000000000000" pitchFamily="2" charset="2"/>
+              </a:rPr>
+              <a:t> not ds?</a:t>
+            </a:r>
+            <a:endParaRPr lang="en-US">
+              <a:solidFill>
+                <a:srgbClr val="C00000"/>
+              </a:solidFill>
+            </a:endParaRPr>
+          </a:p>
+        </p:txBody>
+      </p:sp>
     </p:spTree>
     <p:extLst>
       <p:ext uri="{BB962C8B-B14F-4D97-AF65-F5344CB8AC3E}">
@@ -3687,11 +3835,11 @@
   <p:clrMapOvr>
     <a:masterClrMapping/>
   </p:clrMapOvr>
-  <mc:AlternateContent xmlns:mc="http://schemas.openxmlformats.org/markup-compatibility/2006">
-    <mc:Choice xmlns:p14="http://schemas.microsoft.com/office/powerpoint/2010/main" Requires="p14">
+  <mc:AlternateContent xmlns:mc="http://schemas.openxmlformats.org/markup-compatibility/2006" xmlns:p14="http://schemas.microsoft.com/office/powerpoint/2010/main">
+    <mc:Choice Requires="p14">
       <p:transition spd="slow" p14:dur="2000"/>
     </mc:Choice>
-    <mc:Fallback>
+    <mc:Fallback xmlns="">
       <p:transition spd="slow"/>
     </mc:Fallback>
   </mc:AlternateContent>
@@ -4186,11 +4334,11 @@
   <p:clrMapOvr>
     <a:masterClrMapping/>
   </p:clrMapOvr>
-  <mc:AlternateContent xmlns:mc="http://schemas.openxmlformats.org/markup-compatibility/2006">
-    <mc:Choice xmlns:p14="http://schemas.microsoft.com/office/powerpoint/2010/main" Requires="p14">
+  <mc:AlternateContent xmlns:mc="http://schemas.openxmlformats.org/markup-compatibility/2006" xmlns:p14="http://schemas.microsoft.com/office/powerpoint/2010/main">
+    <mc:Choice Requires="p14">
       <p:transition spd="slow" p14:dur="2000"/>
     </mc:Choice>
-    <mc:Fallback>
+    <mc:Fallback xmlns="">
       <p:transition spd="slow"/>
     </mc:Fallback>
   </mc:AlternateContent>
@@ -4511,7 +4659,6 @@
               <a:rPr lang="en-US" smtClean="0"/>
               <a:t>DSI threshold to identify ds is only set in tp 120 &amp; 240</a:t>
             </a:r>
-            <a:endParaRPr lang="en-US" smtClean="0"/>
           </a:p>
         </p:txBody>
       </p:sp>
@@ -4610,23 +4757,15 @@
             </a:r>
             <a:r>
               <a:rPr lang="en-US"/>
-              <a:t>ds cells are less </a:t>
+              <a:t>ds cells are less cleanly </a:t>
+            </a:r>
+            <a:r>
+              <a:rPr lang="en-US" smtClean="0"/>
+              <a:t>defined (?), can we still use </a:t>
             </a:r>
             <a:r>
               <a:rPr lang="en-US"/>
-              <a:t>cleanly </a:t>
-            </a:r>
-            <a:r>
-              <a:rPr lang="en-US" smtClean="0"/>
-              <a:t>defined (?), can we still use </a:t>
-            </a:r>
-            <a:r>
-              <a:rPr lang="en-US"/>
-              <a:t>off </a:t>
-            </a:r>
-            <a:r>
-              <a:rPr lang="en-US"/>
-              <a:t>response </a:t>
+              <a:t>off response </a:t>
             </a:r>
             <a:r>
               <a:rPr lang="en-US" smtClean="0"/>

</xml_diff>